<commit_message>
[ADD] 필요한 file 생성
</commit_message>
<xml_diff>
--- a/algorithm/프로젝트 설계도.pptx
+++ b/algorithm/프로젝트 설계도.pptx
@@ -124,7 +124,7 @@
 <file path=ppt/revisionInfo.xml><?xml version="1.0" encoding="utf-8"?>
 <p1510:revInfo xmlns:a="http://schemas.openxmlformats.org/drawingml/2006/main" xmlns:r="http://schemas.openxmlformats.org/officeDocument/2006/relationships" xmlns:p1510="http://schemas.microsoft.com/office/powerpoint/2015/10/main">
   <p1510:revLst>
-    <p1510:client id="{6FBE7086-86CD-4247-A8E8-803CB6B116F4}" v="255" dt="2021-12-31T17:26:52.116"/>
+    <p1510:client id="{E73D32A2-863E-4EAE-A568-032A36E97E26}" v="2" dt="2022-01-02T13:00:54.202"/>
   </p1510:revLst>
 </p1510:revInfo>
 </file>
@@ -537,6 +537,61 @@
       </pc:sldChg>
     </pc:docChg>
   </pc:docChgLst>
+  <pc:docChgLst>
+    <pc:chgData name="윤동진" userId="2fcd9c2e-b7f8-4d2a-8c90-80f9a983f291" providerId="ADAL" clId="{E73D32A2-863E-4EAE-A568-032A36E97E26}"/>
+    <pc:docChg chg="custSel modSld">
+      <pc:chgData name="윤동진" userId="2fcd9c2e-b7f8-4d2a-8c90-80f9a983f291" providerId="ADAL" clId="{E73D32A2-863E-4EAE-A568-032A36E97E26}" dt="2022-01-02T13:00:58.679" v="9" actId="1076"/>
+      <pc:docMkLst>
+        <pc:docMk/>
+      </pc:docMkLst>
+      <pc:sldChg chg="addSp delSp modSp mod">
+        <pc:chgData name="윤동진" userId="2fcd9c2e-b7f8-4d2a-8c90-80f9a983f291" providerId="ADAL" clId="{E73D32A2-863E-4EAE-A568-032A36E97E26}" dt="2022-01-02T13:00:50.779" v="5" actId="1076"/>
+        <pc:sldMkLst>
+          <pc:docMk/>
+          <pc:sldMk cId="1317015437" sldId="259"/>
+        </pc:sldMkLst>
+        <pc:picChg chg="add mod">
+          <ac:chgData name="윤동진" userId="2fcd9c2e-b7f8-4d2a-8c90-80f9a983f291" providerId="ADAL" clId="{E73D32A2-863E-4EAE-A568-032A36E97E26}" dt="2022-01-02T13:00:50.779" v="5" actId="1076"/>
+          <ac:picMkLst>
+            <pc:docMk/>
+            <pc:sldMk cId="1317015437" sldId="259"/>
+            <ac:picMk id="5" creationId="{BCD0BA33-FD81-437B-8A67-84D252F3EA82}"/>
+          </ac:picMkLst>
+        </pc:picChg>
+        <pc:picChg chg="del">
+          <ac:chgData name="윤동진" userId="2fcd9c2e-b7f8-4d2a-8c90-80f9a983f291" providerId="ADAL" clId="{E73D32A2-863E-4EAE-A568-032A36E97E26}" dt="2022-01-02T13:00:37.092" v="0" actId="478"/>
+          <ac:picMkLst>
+            <pc:docMk/>
+            <pc:sldMk cId="1317015437" sldId="259"/>
+            <ac:picMk id="7" creationId="{E6C6416B-6096-478A-B026-492404A3A8E7}"/>
+          </ac:picMkLst>
+        </pc:picChg>
+      </pc:sldChg>
+      <pc:sldChg chg="addSp delSp modSp mod">
+        <pc:chgData name="윤동진" userId="2fcd9c2e-b7f8-4d2a-8c90-80f9a983f291" providerId="ADAL" clId="{E73D32A2-863E-4EAE-A568-032A36E97E26}" dt="2022-01-02T13:00:58.679" v="9" actId="1076"/>
+        <pc:sldMkLst>
+          <pc:docMk/>
+          <pc:sldMk cId="848430383" sldId="262"/>
+        </pc:sldMkLst>
+        <pc:picChg chg="add mod">
+          <ac:chgData name="윤동진" userId="2fcd9c2e-b7f8-4d2a-8c90-80f9a983f291" providerId="ADAL" clId="{E73D32A2-863E-4EAE-A568-032A36E97E26}" dt="2022-01-02T13:00:58.679" v="9" actId="1076"/>
+          <ac:picMkLst>
+            <pc:docMk/>
+            <pc:sldMk cId="848430383" sldId="262"/>
+            <ac:picMk id="5" creationId="{96797420-7F7E-441E-8589-C1AB0D770864}"/>
+          </ac:picMkLst>
+        </pc:picChg>
+        <pc:picChg chg="del">
+          <ac:chgData name="윤동진" userId="2fcd9c2e-b7f8-4d2a-8c90-80f9a983f291" providerId="ADAL" clId="{E73D32A2-863E-4EAE-A568-032A36E97E26}" dt="2022-01-02T13:00:53.127" v="6" actId="478"/>
+          <ac:picMkLst>
+            <pc:docMk/>
+            <pc:sldMk cId="848430383" sldId="262"/>
+            <ac:picMk id="8" creationId="{09EF44CC-5502-4A8D-BD93-78310CD2462E}"/>
+          </ac:picMkLst>
+        </pc:picChg>
+      </pc:sldChg>
+    </pc:docChg>
+  </pc:docChgLst>
 </pc:chgInfo>
 </file>
 
@@ -687,7 +742,7 @@
           <a:p>
             <a:fld id="{E6B1F4C5-25A9-460E-8E71-A10071A62414}" type="datetimeFigureOut">
               <a:rPr lang="ko-KR" altLang="en-US" smtClean="0"/>
-              <a:t>2022-01-01</a:t>
+              <a:t>2022-01-02</a:t>
             </a:fld>
             <a:endParaRPr lang="ko-KR" altLang="en-US"/>
           </a:p>
@@ -885,7 +940,7 @@
           <a:p>
             <a:fld id="{E6B1F4C5-25A9-460E-8E71-A10071A62414}" type="datetimeFigureOut">
               <a:rPr lang="ko-KR" altLang="en-US" smtClean="0"/>
-              <a:t>2022-01-01</a:t>
+              <a:t>2022-01-02</a:t>
             </a:fld>
             <a:endParaRPr lang="ko-KR" altLang="en-US"/>
           </a:p>
@@ -1093,7 +1148,7 @@
           <a:p>
             <a:fld id="{E6B1F4C5-25A9-460E-8E71-A10071A62414}" type="datetimeFigureOut">
               <a:rPr lang="ko-KR" altLang="en-US" smtClean="0"/>
-              <a:t>2022-01-01</a:t>
+              <a:t>2022-01-02</a:t>
             </a:fld>
             <a:endParaRPr lang="ko-KR" altLang="en-US"/>
           </a:p>
@@ -1291,7 +1346,7 @@
           <a:p>
             <a:fld id="{E6B1F4C5-25A9-460E-8E71-A10071A62414}" type="datetimeFigureOut">
               <a:rPr lang="ko-KR" altLang="en-US" smtClean="0"/>
-              <a:t>2022-01-01</a:t>
+              <a:t>2022-01-02</a:t>
             </a:fld>
             <a:endParaRPr lang="ko-KR" altLang="en-US"/>
           </a:p>
@@ -1566,7 +1621,7 @@
           <a:p>
             <a:fld id="{E6B1F4C5-25A9-460E-8E71-A10071A62414}" type="datetimeFigureOut">
               <a:rPr lang="ko-KR" altLang="en-US" smtClean="0"/>
-              <a:t>2022-01-01</a:t>
+              <a:t>2022-01-02</a:t>
             </a:fld>
             <a:endParaRPr lang="ko-KR" altLang="en-US"/>
           </a:p>
@@ -1831,7 +1886,7 @@
           <a:p>
             <a:fld id="{E6B1F4C5-25A9-460E-8E71-A10071A62414}" type="datetimeFigureOut">
               <a:rPr lang="ko-KR" altLang="en-US" smtClean="0"/>
-              <a:t>2022-01-01</a:t>
+              <a:t>2022-01-02</a:t>
             </a:fld>
             <a:endParaRPr lang="ko-KR" altLang="en-US"/>
           </a:p>
@@ -2243,7 +2298,7 @@
           <a:p>
             <a:fld id="{E6B1F4C5-25A9-460E-8E71-A10071A62414}" type="datetimeFigureOut">
               <a:rPr lang="ko-KR" altLang="en-US" smtClean="0"/>
-              <a:t>2022-01-01</a:t>
+              <a:t>2022-01-02</a:t>
             </a:fld>
             <a:endParaRPr lang="ko-KR" altLang="en-US"/>
           </a:p>
@@ -2384,7 +2439,7 @@
           <a:p>
             <a:fld id="{E6B1F4C5-25A9-460E-8E71-A10071A62414}" type="datetimeFigureOut">
               <a:rPr lang="ko-KR" altLang="en-US" smtClean="0"/>
-              <a:t>2022-01-01</a:t>
+              <a:t>2022-01-02</a:t>
             </a:fld>
             <a:endParaRPr lang="ko-KR" altLang="en-US"/>
           </a:p>
@@ -2497,7 +2552,7 @@
           <a:p>
             <a:fld id="{E6B1F4C5-25A9-460E-8E71-A10071A62414}" type="datetimeFigureOut">
               <a:rPr lang="ko-KR" altLang="en-US" smtClean="0"/>
-              <a:t>2022-01-01</a:t>
+              <a:t>2022-01-02</a:t>
             </a:fld>
             <a:endParaRPr lang="ko-KR" altLang="en-US"/>
           </a:p>
@@ -2808,7 +2863,7 @@
           <a:p>
             <a:fld id="{E6B1F4C5-25A9-460E-8E71-A10071A62414}" type="datetimeFigureOut">
               <a:rPr lang="ko-KR" altLang="en-US" smtClean="0"/>
-              <a:t>2022-01-01</a:t>
+              <a:t>2022-01-02</a:t>
             </a:fld>
             <a:endParaRPr lang="ko-KR" altLang="en-US"/>
           </a:p>
@@ -3096,7 +3151,7 @@
           <a:p>
             <a:fld id="{E6B1F4C5-25A9-460E-8E71-A10071A62414}" type="datetimeFigureOut">
               <a:rPr lang="ko-KR" altLang="en-US" smtClean="0"/>
-              <a:t>2022-01-01</a:t>
+              <a:t>2022-01-02</a:t>
             </a:fld>
             <a:endParaRPr lang="ko-KR" altLang="en-US"/>
           </a:p>
@@ -3337,7 +3392,7 @@
           <a:p>
             <a:fld id="{E6B1F4C5-25A9-460E-8E71-A10071A62414}" type="datetimeFigureOut">
               <a:rPr lang="ko-KR" altLang="en-US" smtClean="0"/>
-              <a:t>2022-01-01</a:t>
+              <a:t>2022-01-02</a:t>
             </a:fld>
             <a:endParaRPr lang="ko-KR" altLang="en-US"/>
           </a:p>
@@ -4738,10 +4793,10 @@
       </p:sp>
       <p:pic>
         <p:nvPicPr>
-          <p:cNvPr id="7" name="그림 6">
-            <a:extLst>
-              <a:ext uri="{FF2B5EF4-FFF2-40B4-BE49-F238E27FC236}">
-                <a16:creationId xmlns:a16="http://schemas.microsoft.com/office/drawing/2014/main" id="{E6C6416B-6096-478A-B026-492404A3A8E7}"/>
+          <p:cNvPr id="5" name="그림 4">
+            <a:extLst>
+              <a:ext uri="{FF2B5EF4-FFF2-40B4-BE49-F238E27FC236}">
+                <a16:creationId xmlns:a16="http://schemas.microsoft.com/office/drawing/2014/main" id="{BCD0BA33-FD81-437B-8A67-84D252F3EA82}"/>
               </a:ext>
             </a:extLst>
           </p:cNvPr>
@@ -4751,15 +4806,21 @@
           <p:nvPr/>
         </p:nvPicPr>
         <p:blipFill>
-          <a:blip r:embed="rId2"/>
+          <a:blip r:embed="rId2">
+            <a:extLst>
+              <a:ext uri="{28A0092B-C50C-407E-A947-70E740481C1C}">
+                <a14:useLocalDpi xmlns:a14="http://schemas.microsoft.com/office/drawing/2010/main" val="0"/>
+              </a:ext>
+            </a:extLst>
+          </a:blip>
           <a:stretch>
             <a:fillRect/>
           </a:stretch>
         </p:blipFill>
         <p:spPr>
           <a:xfrm>
-            <a:off x="4612640" y="1"/>
-            <a:ext cx="7579360" cy="6858000"/>
+            <a:off x="5039362" y="0"/>
+            <a:ext cx="7152638" cy="6857999"/>
           </a:xfrm>
           <a:prstGeom prst="rect">
             <a:avLst/>
@@ -4878,10 +4939,10 @@
       </p:sp>
       <p:pic>
         <p:nvPicPr>
-          <p:cNvPr id="8" name="그림 7">
-            <a:extLst>
-              <a:ext uri="{FF2B5EF4-FFF2-40B4-BE49-F238E27FC236}">
-                <a16:creationId xmlns:a16="http://schemas.microsoft.com/office/drawing/2014/main" id="{09EF44CC-5502-4A8D-BD93-78310CD2462E}"/>
+          <p:cNvPr id="5" name="그림 4">
+            <a:extLst>
+              <a:ext uri="{FF2B5EF4-FFF2-40B4-BE49-F238E27FC236}">
+                <a16:creationId xmlns:a16="http://schemas.microsoft.com/office/drawing/2014/main" id="{96797420-7F7E-441E-8589-C1AB0D770864}"/>
               </a:ext>
             </a:extLst>
           </p:cNvPr>
@@ -4891,15 +4952,21 @@
           <p:nvPr/>
         </p:nvPicPr>
         <p:blipFill>
-          <a:blip r:embed="rId2"/>
+          <a:blip r:embed="rId2">
+            <a:extLst>
+              <a:ext uri="{28A0092B-C50C-407E-A947-70E740481C1C}">
+                <a14:useLocalDpi xmlns:a14="http://schemas.microsoft.com/office/drawing/2010/main" val="0"/>
+              </a:ext>
+            </a:extLst>
+          </a:blip>
           <a:stretch>
             <a:fillRect/>
           </a:stretch>
         </p:blipFill>
         <p:spPr>
           <a:xfrm>
-            <a:off x="6508785" y="0"/>
-            <a:ext cx="5683215" cy="6858000"/>
+            <a:off x="6653726" y="0"/>
+            <a:ext cx="5538274" cy="6858000"/>
           </a:xfrm>
           <a:prstGeom prst="rect">
             <a:avLst/>

</xml_diff>